<commit_message>
Added pretty pictures for each satellite type
</commit_message>
<xml_diff>
--- a/CMQA/Mission Configuration Trade Study/RCL-O-CMQA2 Mission Configuration Trade Study Visualization.pptx
+++ b/CMQA/Mission Configuration Trade Study/RCL-O-CMQA2 Mission Configuration Trade Study Visualization.pptx
@@ -255,11 +255,11 @@
             </c:numRef>
           </c:yVal>
         </c:ser>
-        <c:axId val="122826752"/>
-        <c:axId val="122829056"/>
+        <c:axId val="85024128"/>
+        <c:axId val="81290752"/>
       </c:scatterChart>
       <c:valAx>
-        <c:axId val="122826752"/>
+        <c:axId val="85024128"/>
         <c:scaling>
           <c:orientation val="minMax"/>
           <c:max val="4"/>
@@ -288,13 +288,13 @@
         </c:title>
         <c:numFmt formatCode="General" sourceLinked="1"/>
         <c:tickLblPos val="nextTo"/>
-        <c:crossAx val="122829056"/>
+        <c:crossAx val="81290752"/>
         <c:crosses val="autoZero"/>
         <c:crossBetween val="midCat"/>
         <c:majorUnit val="1"/>
       </c:valAx>
       <c:valAx>
-        <c:axId val="122829056"/>
+        <c:axId val="81290752"/>
         <c:scaling>
           <c:logBase val="10"/>
           <c:orientation val="minMax"/>
@@ -334,7 +334,7 @@
         </c:title>
         <c:numFmt formatCode="General" sourceLinked="1"/>
         <c:tickLblPos val="nextTo"/>
-        <c:crossAx val="122826752"/>
+        <c:crossAx val="85024128"/>
         <c:crosses val="autoZero"/>
         <c:crossBetween val="midCat"/>
       </c:valAx>
@@ -346,9 +346,9 @@
           <c:xMode val="edge"/>
           <c:yMode val="edge"/>
           <c:x val="0.8730943905279146"/>
-          <c:y val="0.4697810855943656"/>
+          <c:y val="0.46978108559436565"/>
           <c:w val="8.4426734725136426E-2"/>
-          <c:h val="6.8515499109389144E-2"/>
+          <c:h val="6.8515499109389158E-2"/>
         </c:manualLayout>
       </c:layout>
       <c:overlay val="1"/>
@@ -520,11 +520,11 @@
             </c:numRef>
           </c:yVal>
         </c:ser>
-        <c:axId val="121059584"/>
-        <c:axId val="121066240"/>
+        <c:axId val="86846464"/>
+        <c:axId val="86926464"/>
       </c:scatterChart>
       <c:valAx>
-        <c:axId val="121059584"/>
+        <c:axId val="86846464"/>
         <c:scaling>
           <c:orientation val="minMax"/>
           <c:max val="4"/>
@@ -553,13 +553,13 @@
         </c:title>
         <c:numFmt formatCode="General" sourceLinked="1"/>
         <c:tickLblPos val="nextTo"/>
-        <c:crossAx val="121066240"/>
+        <c:crossAx val="86926464"/>
         <c:crosses val="autoZero"/>
         <c:crossBetween val="midCat"/>
         <c:majorUnit val="1"/>
       </c:valAx>
       <c:valAx>
-        <c:axId val="121066240"/>
+        <c:axId val="86926464"/>
         <c:scaling>
           <c:logBase val="10"/>
           <c:orientation val="minMax"/>
@@ -599,7 +599,7 @@
         </c:title>
         <c:numFmt formatCode="General" sourceLinked="1"/>
         <c:tickLblPos val="nextTo"/>
-        <c:crossAx val="121059584"/>
+        <c:crossAx val="86846464"/>
         <c:crosses val="autoZero"/>
         <c:crossBetween val="midCat"/>
       </c:valAx>
@@ -610,10 +610,10 @@
         <c:manualLayout>
           <c:xMode val="edge"/>
           <c:yMode val="edge"/>
-          <c:x val="0.877356925890453"/>
+          <c:x val="0.87735692589045289"/>
           <c:y val="0.42639970284349898"/>
           <c:w val="8.6023354500107965E-2"/>
-          <c:h val="0.10277324866408374"/>
+          <c:h val="0.10277324866408376"/>
         </c:manualLayout>
       </c:layout>
       <c:overlay val="1"/>
@@ -666,31 +666,37 @@
           </c:spPr>
           <c:xVal>
             <c:numRef>
-              <c:f>('Launched Mission Data'!$D$2,'Launched Mission Data'!$D$10,'Launched Mission Data'!$D$11,'Launched Mission Data'!$D$12)</c:f>
+              <c:f>('Launched Mission Data'!$G$2,'Launched Mission Data'!$G$10,'Launched Mission Data'!$G$11,'Launched Mission Data'!$G$12,'Launched Mission Data'!$G$15,'Launched Mission Data'!$G$16)</c:f>
               <c:numCache>
-                <c:formatCode>General</c:formatCode>
-                <c:ptCount val="4"/>
+                <c:formatCode>0</c:formatCode>
+                <c:ptCount val="6"/>
                 <c:pt idx="0">
+                  <c:v>99.790239999999997</c:v>
+                </c:pt>
+                <c:pt idx="1">
+                  <c:v>1315.4168</c:v>
+                </c:pt>
+                <c:pt idx="2">
+                  <c:v>28.122703999999999</c:v>
+                </c:pt>
+                <c:pt idx="3">
+                  <c:v>453.59199999999998</c:v>
+                </c:pt>
+                <c:pt idx="4">
                   <c:v>1</c:v>
                 </c:pt>
-                <c:pt idx="1">
-                  <c:v>2</c:v>
-                </c:pt>
-                <c:pt idx="2">
-                  <c:v>1</c:v>
-                </c:pt>
-                <c:pt idx="3">
-                  <c:v>3</c:v>
+                <c:pt idx="5" formatCode="General">
+                  <c:v>7.5</c:v>
                 </c:pt>
               </c:numCache>
             </c:numRef>
           </c:xVal>
           <c:yVal>
             <c:numRef>
-              <c:f>('Launched Mission Data'!$H$2,'Launched Mission Data'!$H$10,'Launched Mission Data'!$H$11,'Launched Mission Data'!$H$12)</c:f>
+              <c:f>('Launched Mission Data'!$I$2,'Launched Mission Data'!$I$10,'Launched Mission Data'!$I$11,'Launched Mission Data'!$I$12,'Launched Mission Data'!$I$15,'Launched Mission Data'!$I$16)</c:f>
               <c:numCache>
                 <c:formatCode>General</c:formatCode>
-                <c:ptCount val="4"/>
+                <c:ptCount val="6"/>
                 <c:pt idx="0">
                   <c:v>80</c:v>
                 </c:pt>
@@ -702,6 +708,12 @@
                 </c:pt>
                 <c:pt idx="3">
                   <c:v>30</c:v>
+                </c:pt>
+                <c:pt idx="4">
+                  <c:v>0.2</c:v>
+                </c:pt>
+                <c:pt idx="5">
+                  <c:v>0.5</c:v>
                 </c:pt>
               </c:numCache>
             </c:numRef>
@@ -720,22 +732,22 @@
           </c:spPr>
           <c:xVal>
             <c:numRef>
-              <c:f>('Launched Mission Data'!$D$4,'Launched Mission Data'!$D$6)</c:f>
+              <c:f>('Launched Mission Data'!$G$4,'Launched Mission Data'!$G$6)</c:f>
               <c:numCache>
-                <c:formatCode>General</c:formatCode>
+                <c:formatCode>0</c:formatCode>
                 <c:ptCount val="2"/>
                 <c:pt idx="0">
-                  <c:v>1</c:v>
+                  <c:v>98</c:v>
                 </c:pt>
                 <c:pt idx="1">
-                  <c:v>1</c:v>
+                  <c:v>8.1646560000000008</c:v>
                 </c:pt>
               </c:numCache>
             </c:numRef>
           </c:xVal>
           <c:yVal>
             <c:numRef>
-              <c:f>('Launched Mission Data'!$H$4,'Launched Mission Data'!$H$6)</c:f>
+              <c:f>('Launched Mission Data'!$I$4,'Launched Mission Data'!$I$6)</c:f>
               <c:numCache>
                 <c:formatCode>General</c:formatCode>
                 <c:ptCount val="2"/>
@@ -760,21 +772,28 @@
               <a:noFill/>
             </a:ln>
           </c:spPr>
+          <c:marker>
+            <c:spPr>
+              <a:solidFill>
+                <a:srgbClr val="00B050"/>
+              </a:solidFill>
+            </c:spPr>
+          </c:marker>
           <c:xVal>
             <c:numRef>
-              <c:f>'Launched Mission Data'!$D$14</c:f>
+              <c:f>'Launched Mission Data'!$G$14</c:f>
               <c:numCache>
-                <c:formatCode>General</c:formatCode>
+                <c:formatCode>0</c:formatCode>
                 <c:ptCount val="1"/>
                 <c:pt idx="0">
-                  <c:v>2</c:v>
+                  <c:v>13.607759999999999</c:v>
                 </c:pt>
               </c:numCache>
             </c:numRef>
           </c:xVal>
           <c:yVal>
             <c:numRef>
-              <c:f>'Launched Mission Data'!$H$14</c:f>
+              <c:f>'Launched Mission Data'!$I$14</c:f>
               <c:numCache>
                 <c:formatCode>General</c:formatCode>
                 <c:ptCount val="1"/>
@@ -785,14 +804,14 @@
             </c:numRef>
           </c:yVal>
         </c:ser>
-        <c:axId val="119771904"/>
-        <c:axId val="119773824"/>
+        <c:axId val="81541376"/>
+        <c:axId val="81574528"/>
       </c:scatterChart>
       <c:valAx>
-        <c:axId val="119771904"/>
+        <c:axId val="81541376"/>
         <c:scaling>
+          <c:logBase val="10"/>
           <c:orientation val="minMax"/>
-          <c:max val="4"/>
         </c:scaling>
         <c:axPos val="b"/>
         <c:title>
@@ -809,22 +828,21 @@
                     <a:latin typeface="Times New Roman" pitchFamily="18" charset="0"/>
                     <a:cs typeface="Times New Roman" pitchFamily="18" charset="0"/>
                   </a:rPr>
-                  <a:t>Number of Spacecraft</a:t>
+                  <a:t>Weight (kg)</a:t>
                 </a:r>
               </a:p>
             </c:rich>
           </c:tx>
           <c:layout/>
         </c:title>
-        <c:numFmt formatCode="General" sourceLinked="1"/>
+        <c:numFmt formatCode="0" sourceLinked="1"/>
         <c:tickLblPos val="nextTo"/>
-        <c:crossAx val="119773824"/>
+        <c:crossAx val="81574528"/>
         <c:crosses val="autoZero"/>
         <c:crossBetween val="midCat"/>
-        <c:majorUnit val="1"/>
       </c:valAx>
       <c:valAx>
-        <c:axId val="119773824"/>
+        <c:axId val="81574528"/>
         <c:scaling>
           <c:orientation val="minMax"/>
         </c:scaling>
@@ -863,7 +881,7 @@
         </c:title>
         <c:numFmt formatCode="General" sourceLinked="1"/>
         <c:tickLblPos val="nextTo"/>
-        <c:crossAx val="119771904"/>
+        <c:crossAx val="81541376"/>
         <c:crosses val="autoZero"/>
         <c:crossBetween val="midCat"/>
       </c:valAx>
@@ -874,10 +892,10 @@
         <c:manualLayout>
           <c:xMode val="edge"/>
           <c:yMode val="edge"/>
-          <c:x val="0.88907223738528529"/>
-          <c:y val="0.42704973268953667"/>
+          <c:x val="8.4903194762007583E-2"/>
+          <c:y val="2.7205052932591841E-2"/>
           <c:w val="8.6023354500107965E-2"/>
-          <c:h val="0.10277324866408374"/>
+          <c:h val="0.10277324866408376"/>
         </c:manualLayout>
       </c:layout>
       <c:overlay val="1"/>
@@ -2727,12 +2745,12 @@
 <c:userShapes xmlns:c="http://schemas.openxmlformats.org/drawingml/2006/chart">
   <cdr:relSizeAnchor xmlns:cdr="http://schemas.openxmlformats.org/drawingml/2006/chartDrawing">
     <cdr:from>
-      <cdr:x>0.30564</cdr:x>
-      <cdr:y>0.63107</cdr:y>
+      <cdr:x>0.40987</cdr:x>
+      <cdr:y>0.63495</cdr:y>
     </cdr:from>
     <cdr:to>
-      <cdr:x>0.38873</cdr:x>
-      <cdr:y>0.67379</cdr:y>
+      <cdr:x>0.49296</cdr:x>
+      <cdr:y>0.67767</cdr:y>
     </cdr:to>
     <cdr:sp macro="" textlink="">
       <cdr:nvSpPr>
@@ -2741,12 +2759,23 @@
       </cdr:nvSpPr>
       <cdr:spPr>
         <a:xfrm xmlns:a="http://schemas.openxmlformats.org/drawingml/2006/main">
-          <a:off x="2649938" y="3968748"/>
-          <a:ext cx="720406" cy="268664"/>
+          <a:off x="3553611" y="3993186"/>
+          <a:ext cx="720407" cy="268663"/>
         </a:xfrm>
         <a:prstGeom xmlns:a="http://schemas.openxmlformats.org/drawingml/2006/main" prst="rect">
           <a:avLst/>
         </a:prstGeom>
+        <a:solidFill xmlns:a="http://schemas.openxmlformats.org/drawingml/2006/main">
+          <a:schemeClr val="tx1">
+            <a:lumMod val="65000"/>
+            <a:lumOff val="35000"/>
+          </a:schemeClr>
+        </a:solidFill>
+        <a:ln xmlns:a="http://schemas.openxmlformats.org/drawingml/2006/main">
+          <a:solidFill>
+            <a:sysClr val="windowText" lastClr="000000"/>
+          </a:solidFill>
+        </a:ln>
       </cdr:spPr>
       <cdr:txBody>
         <a:bodyPr xmlns:a="http://schemas.openxmlformats.org/drawingml/2006/main" wrap="square" rtlCol="0"/>
@@ -2816,8 +2845,12 @@
           </a:lvl9pPr>
         </a:lstStyle>
         <a:p xmlns:a="http://schemas.openxmlformats.org/drawingml/2006/main">
+          <a:pPr algn="ctr"/>
           <a:r>
-            <a:rPr lang="en-US" sz="1100">
+            <a:rPr lang="en-US" sz="1100" b="1">
+              <a:solidFill>
+                <a:schemeClr val="bg1"/>
+              </a:solidFill>
               <a:latin typeface="Times New Roman" pitchFamily="18" charset="0"/>
               <a:cs typeface="Times New Roman" pitchFamily="18" charset="0"/>
             </a:rPr>
@@ -2829,12 +2862,12 @@
   </cdr:relSizeAnchor>
   <cdr:relSizeAnchor xmlns:cdr="http://schemas.openxmlformats.org/drawingml/2006/chartDrawing">
     <cdr:from>
-      <cdr:x>0.30564</cdr:x>
-      <cdr:y>0.68932</cdr:y>
+      <cdr:x>0.53099</cdr:x>
+      <cdr:y>0.68349</cdr:y>
     </cdr:from>
     <cdr:to>
-      <cdr:x>0.38873</cdr:x>
-      <cdr:y>0.73204</cdr:y>
+      <cdr:x>0.61408</cdr:x>
+      <cdr:y>0.72621</cdr:y>
     </cdr:to>
     <cdr:sp macro="" textlink="">
       <cdr:nvSpPr>
@@ -2843,12 +2876,23 @@
       </cdr:nvSpPr>
       <cdr:spPr>
         <a:xfrm xmlns:a="http://schemas.openxmlformats.org/drawingml/2006/main">
-          <a:off x="2649939" y="4335095"/>
-          <a:ext cx="720406" cy="268663"/>
+          <a:off x="4603802" y="4298459"/>
+          <a:ext cx="720407" cy="268664"/>
         </a:xfrm>
         <a:prstGeom xmlns:a="http://schemas.openxmlformats.org/drawingml/2006/main" prst="rect">
           <a:avLst/>
         </a:prstGeom>
+        <a:solidFill xmlns:a="http://schemas.openxmlformats.org/drawingml/2006/main">
+          <a:schemeClr val="tx1">
+            <a:lumMod val="65000"/>
+            <a:lumOff val="35000"/>
+          </a:schemeClr>
+        </a:solidFill>
+        <a:ln xmlns:a="http://schemas.openxmlformats.org/drawingml/2006/main">
+          <a:solidFill>
+            <a:schemeClr val="tx1"/>
+          </a:solidFill>
+        </a:ln>
       </cdr:spPr>
       <cdr:txBody>
         <a:bodyPr xmlns:a="http://schemas.openxmlformats.org/drawingml/2006/main" wrap="square" rtlCol="0"/>
@@ -2918,8 +2962,12 @@
           </a:lvl9pPr>
         </a:lstStyle>
         <a:p xmlns:a="http://schemas.openxmlformats.org/drawingml/2006/main">
+          <a:pPr algn="ctr"/>
           <a:r>
-            <a:rPr lang="en-US" sz="1100">
+            <a:rPr lang="en-US" sz="1100" b="1">
+              <a:solidFill>
+                <a:schemeClr val="bg1"/>
+              </a:solidFill>
               <a:latin typeface="Times New Roman" pitchFamily="18" charset="0"/>
               <a:cs typeface="Times New Roman" pitchFamily="18" charset="0"/>
             </a:rPr>
@@ -2931,12 +2979,12 @@
   </cdr:relSizeAnchor>
   <cdr:relSizeAnchor xmlns:cdr="http://schemas.openxmlformats.org/drawingml/2006/chartDrawing">
     <cdr:from>
-      <cdr:x>0.30564</cdr:x>
-      <cdr:y>0.65825</cdr:y>
+      <cdr:x>0.5324</cdr:x>
+      <cdr:y>0.63495</cdr:y>
     </cdr:from>
     <cdr:to>
-      <cdr:x>0.38873</cdr:x>
-      <cdr:y>0.70097</cdr:y>
+      <cdr:x>0.61549</cdr:x>
+      <cdr:y>0.67767</cdr:y>
     </cdr:to>
     <cdr:sp macro="" textlink="">
       <cdr:nvSpPr>
@@ -2945,12 +2993,23 @@
       </cdr:nvSpPr>
       <cdr:spPr>
         <a:xfrm xmlns:a="http://schemas.openxmlformats.org/drawingml/2006/main">
-          <a:off x="2649939" y="4139699"/>
-          <a:ext cx="720406" cy="268664"/>
+          <a:off x="4616014" y="3993158"/>
+          <a:ext cx="720407" cy="268664"/>
         </a:xfrm>
         <a:prstGeom xmlns:a="http://schemas.openxmlformats.org/drawingml/2006/main" prst="rect">
           <a:avLst/>
         </a:prstGeom>
+        <a:solidFill xmlns:a="http://schemas.openxmlformats.org/drawingml/2006/main">
+          <a:schemeClr val="tx1">
+            <a:lumMod val="65000"/>
+            <a:lumOff val="35000"/>
+          </a:schemeClr>
+        </a:solidFill>
+        <a:ln xmlns:a="http://schemas.openxmlformats.org/drawingml/2006/main">
+          <a:solidFill>
+            <a:schemeClr val="tx1"/>
+          </a:solidFill>
+        </a:ln>
       </cdr:spPr>
       <cdr:txBody>
         <a:bodyPr xmlns:a="http://schemas.openxmlformats.org/drawingml/2006/main" wrap="square" rtlCol="0"/>
@@ -3020,8 +3079,12 @@
           </a:lvl9pPr>
         </a:lstStyle>
         <a:p xmlns:a="http://schemas.openxmlformats.org/drawingml/2006/main">
+          <a:pPr algn="ctr"/>
           <a:r>
-            <a:rPr lang="en-US" sz="1100">
+            <a:rPr lang="en-US" sz="1100" b="1">
+              <a:solidFill>
+                <a:schemeClr val="bg1"/>
+              </a:solidFill>
               <a:latin typeface="Times New Roman" pitchFamily="18" charset="0"/>
               <a:cs typeface="Times New Roman" pitchFamily="18" charset="0"/>
             </a:rPr>
@@ -3033,12 +3096,12 @@
   </cdr:relSizeAnchor>
   <cdr:relSizeAnchor xmlns:cdr="http://schemas.openxmlformats.org/drawingml/2006/chartDrawing">
     <cdr:from>
-      <cdr:x>0.53662</cdr:x>
-      <cdr:y>0.87379</cdr:y>
+      <cdr:x>0.33662</cdr:x>
+      <cdr:y>0.8602</cdr:y>
     </cdr:from>
     <cdr:to>
-      <cdr:x>0.61972</cdr:x>
-      <cdr:y>0.91651</cdr:y>
+      <cdr:x>0.41972</cdr:x>
+      <cdr:y>0.90292</cdr:y>
     </cdr:to>
     <cdr:sp macro="" textlink="">
       <cdr:nvSpPr>
@@ -3047,12 +3110,20 @@
       </cdr:nvSpPr>
       <cdr:spPr>
         <a:xfrm xmlns:a="http://schemas.openxmlformats.org/drawingml/2006/main">
-          <a:off x="4652625" y="5495193"/>
-          <a:ext cx="720493" cy="268664"/>
+          <a:off x="2918561" y="5409733"/>
+          <a:ext cx="720493" cy="268663"/>
         </a:xfrm>
         <a:prstGeom xmlns:a="http://schemas.openxmlformats.org/drawingml/2006/main" prst="rect">
           <a:avLst/>
         </a:prstGeom>
+        <a:solidFill xmlns:a="http://schemas.openxmlformats.org/drawingml/2006/main">
+          <a:srgbClr val="00B050"/>
+        </a:solidFill>
+        <a:ln xmlns:a="http://schemas.openxmlformats.org/drawingml/2006/main">
+          <a:solidFill>
+            <a:sysClr val="windowText" lastClr="000000"/>
+          </a:solidFill>
+        </a:ln>
       </cdr:spPr>
       <cdr:txBody>
         <a:bodyPr xmlns:a="http://schemas.openxmlformats.org/drawingml/2006/main" wrap="square" rtlCol="0"/>
@@ -3104,8 +3175,9 @@
           </a:lvl9pPr>
         </a:lstStyle>
         <a:p xmlns:a="http://schemas.openxmlformats.org/drawingml/2006/main">
+          <a:pPr algn="ctr"/>
           <a:r>
-            <a:rPr lang="en-US" sz="1100">
+            <a:rPr lang="en-US" sz="1100" b="1">
               <a:latin typeface="Times New Roman" pitchFamily="18" charset="0"/>
               <a:cs typeface="Times New Roman" pitchFamily="18" charset="0"/>
             </a:rPr>
@@ -3117,12 +3189,12 @@
   </cdr:relSizeAnchor>
   <cdr:relSizeAnchor xmlns:cdr="http://schemas.openxmlformats.org/drawingml/2006/chartDrawing">
     <cdr:from>
-      <cdr:x>0.5324</cdr:x>
-      <cdr:y>0.12816</cdr:y>
+      <cdr:x>0.78733</cdr:x>
+      <cdr:y>0.12622</cdr:y>
     </cdr:from>
     <cdr:to>
-      <cdr:x>0.68592</cdr:x>
-      <cdr:y>0.1767</cdr:y>
+      <cdr:x>0.93803</cdr:x>
+      <cdr:y>0.17476</cdr:y>
     </cdr:to>
     <cdr:sp macro="" textlink="">
       <cdr:nvSpPr>
@@ -3131,12 +3203,22 @@
       </cdr:nvSpPr>
       <cdr:spPr>
         <a:xfrm xmlns:a="http://schemas.openxmlformats.org/drawingml/2006/main">
-          <a:off x="4615991" y="805961"/>
-          <a:ext cx="1331028" cy="305266"/>
+          <a:off x="6826299" y="793780"/>
+          <a:ext cx="1306586" cy="305265"/>
         </a:xfrm>
         <a:prstGeom xmlns:a="http://schemas.openxmlformats.org/drawingml/2006/main" prst="rect">
           <a:avLst/>
         </a:prstGeom>
+        <a:solidFill xmlns:a="http://schemas.openxmlformats.org/drawingml/2006/main">
+          <a:schemeClr val="bg2">
+            <a:lumMod val="75000"/>
+          </a:schemeClr>
+        </a:solidFill>
+        <a:ln xmlns:a="http://schemas.openxmlformats.org/drawingml/2006/main">
+          <a:solidFill>
+            <a:sysClr val="windowText" lastClr="000000"/>
+          </a:solidFill>
+        </a:ln>
       </cdr:spPr>
       <cdr:txBody>
         <a:bodyPr xmlns:a="http://schemas.openxmlformats.org/drawingml/2006/main" wrap="square" rtlCol="0"/>
@@ -3206,21 +3288,31 @@
           </a:lvl9pPr>
         </a:lstStyle>
         <a:p xmlns:a="http://schemas.openxmlformats.org/drawingml/2006/main">
+          <a:pPr algn="ctr"/>
           <a:r>
-            <a:rPr lang="en-US" sz="1100">
+            <a:rPr lang="en-US" sz="1100" b="1">
+              <a:solidFill>
+                <a:sysClr val="windowText" lastClr="000000"/>
+              </a:solidFill>
               <a:latin typeface="Times New Roman" pitchFamily="18" charset="0"/>
               <a:cs typeface="Times New Roman" pitchFamily="18" charset="0"/>
             </a:rPr>
             <a:t>Orbital</a:t>
           </a:r>
           <a:r>
-            <a:rPr lang="en-US" sz="1100" baseline="0">
+            <a:rPr lang="en-US" sz="1100" b="1" baseline="0">
+              <a:solidFill>
+                <a:sysClr val="windowText" lastClr="000000"/>
+              </a:solidFill>
               <a:latin typeface="Times New Roman" pitchFamily="18" charset="0"/>
               <a:cs typeface="Times New Roman" pitchFamily="18" charset="0"/>
             </a:rPr>
             <a:t> Express</a:t>
           </a:r>
-          <a:endParaRPr lang="en-US" sz="1100">
+          <a:endParaRPr lang="en-US" sz="1100" b="1">
+            <a:solidFill>
+              <a:sysClr val="windowText" lastClr="000000"/>
+            </a:solidFill>
             <a:latin typeface="Times New Roman" pitchFamily="18" charset="0"/>
             <a:cs typeface="Times New Roman" pitchFamily="18" charset="0"/>
           </a:endParaRPr>
@@ -3230,11 +3322,11 @@
   </cdr:relSizeAnchor>
   <cdr:relSizeAnchor xmlns:cdr="http://schemas.openxmlformats.org/drawingml/2006/chartDrawing">
     <cdr:from>
-      <cdr:x>0.7662</cdr:x>
+      <cdr:x>0.67888</cdr:x>
       <cdr:y>0.80971</cdr:y>
     </cdr:from>
     <cdr:to>
-      <cdr:x>0.8493</cdr:x>
+      <cdr:x>0.76198</cdr:x>
       <cdr:y>0.85243</cdr:y>
     </cdr:to>
     <cdr:sp macro="" textlink="">
@@ -3244,12 +3336,22 @@
       </cdr:nvSpPr>
       <cdr:spPr>
         <a:xfrm xmlns:a="http://schemas.openxmlformats.org/drawingml/2006/main">
-          <a:off x="6643074" y="5092206"/>
-          <a:ext cx="720493" cy="268663"/>
+          <a:off x="5885986" y="5092219"/>
+          <a:ext cx="720493" cy="268664"/>
         </a:xfrm>
         <a:prstGeom xmlns:a="http://schemas.openxmlformats.org/drawingml/2006/main" prst="rect">
           <a:avLst/>
         </a:prstGeom>
+        <a:solidFill xmlns:a="http://schemas.openxmlformats.org/drawingml/2006/main">
+          <a:schemeClr val="bg2">
+            <a:lumMod val="75000"/>
+          </a:schemeClr>
+        </a:solidFill>
+        <a:ln xmlns:a="http://schemas.openxmlformats.org/drawingml/2006/main">
+          <a:solidFill>
+            <a:sysClr val="windowText" lastClr="000000"/>
+          </a:solidFill>
+        </a:ln>
       </cdr:spPr>
       <cdr:txBody>
         <a:bodyPr xmlns:a="http://schemas.openxmlformats.org/drawingml/2006/main" wrap="square" rtlCol="0"/>
@@ -3319,8 +3421,12 @@
           </a:lvl9pPr>
         </a:lstStyle>
         <a:p xmlns:a="http://schemas.openxmlformats.org/drawingml/2006/main">
+          <a:pPr algn="ctr"/>
           <a:r>
-            <a:rPr lang="en-US" sz="1100">
+            <a:rPr lang="en-US" sz="1100" b="1">
+              <a:solidFill>
+                <a:sysClr val="windowText" lastClr="000000"/>
+              </a:solidFill>
               <a:latin typeface="Times New Roman" pitchFamily="18" charset="0"/>
               <a:cs typeface="Times New Roman" pitchFamily="18" charset="0"/>
             </a:rPr>
@@ -3332,12 +3438,12 @@
   </cdr:relSizeAnchor>
   <cdr:relSizeAnchor xmlns:cdr="http://schemas.openxmlformats.org/drawingml/2006/chartDrawing">
     <cdr:from>
-      <cdr:x>0.30564</cdr:x>
-      <cdr:y>0.8699</cdr:y>
+      <cdr:x>0.30987</cdr:x>
+      <cdr:y>0.76893</cdr:y>
     </cdr:from>
     <cdr:to>
-      <cdr:x>0.38873</cdr:x>
-      <cdr:y>0.91262</cdr:y>
+      <cdr:x>0.39296</cdr:x>
+      <cdr:y>0.81165</cdr:y>
     </cdr:to>
     <cdr:sp macro="" textlink="">
       <cdr:nvSpPr>
@@ -3346,12 +3452,23 @@
       </cdr:nvSpPr>
       <cdr:spPr>
         <a:xfrm xmlns:a="http://schemas.openxmlformats.org/drawingml/2006/main">
-          <a:off x="2649931" y="5470776"/>
-          <a:ext cx="720406" cy="268663"/>
+          <a:off x="2686592" y="4835752"/>
+          <a:ext cx="720407" cy="268663"/>
         </a:xfrm>
         <a:prstGeom xmlns:a="http://schemas.openxmlformats.org/drawingml/2006/main" prst="rect">
           <a:avLst/>
         </a:prstGeom>
+        <a:solidFill xmlns:a="http://schemas.openxmlformats.org/drawingml/2006/main">
+          <a:schemeClr val="tx1">
+            <a:lumMod val="95000"/>
+            <a:lumOff val="5000"/>
+          </a:schemeClr>
+        </a:solidFill>
+        <a:ln xmlns:a="http://schemas.openxmlformats.org/drawingml/2006/main">
+          <a:solidFill>
+            <a:sysClr val="windowText" lastClr="000000"/>
+          </a:solidFill>
+        </a:ln>
       </cdr:spPr>
       <cdr:txBody>
         <a:bodyPr xmlns:a="http://schemas.openxmlformats.org/drawingml/2006/main" wrap="square" rtlCol="0"/>
@@ -3421,13 +3538,1008 @@
           </a:lvl9pPr>
         </a:lstStyle>
         <a:p xmlns:a="http://schemas.openxmlformats.org/drawingml/2006/main">
+          <a:pPr algn="ctr"/>
           <a:r>
-            <a:rPr lang="en-US" sz="1100">
+            <a:rPr lang="en-US" sz="1100" b="1">
+              <a:solidFill>
+                <a:schemeClr val="bg1"/>
+              </a:solidFill>
               <a:latin typeface="Times New Roman" pitchFamily="18" charset="0"/>
               <a:cs typeface="Times New Roman" pitchFamily="18" charset="0"/>
             </a:rPr>
             <a:t>SNAP-1</a:t>
           </a:r>
+        </a:p>
+      </cdr:txBody>
+    </cdr:sp>
+  </cdr:relSizeAnchor>
+  <cdr:relSizeAnchor xmlns:cdr="http://schemas.openxmlformats.org/drawingml/2006/chartDrawing">
+    <cdr:from>
+      <cdr:x>0.1507</cdr:x>
+      <cdr:y>0.72039</cdr:y>
+    </cdr:from>
+    <cdr:to>
+      <cdr:x>0.26901</cdr:x>
+      <cdr:y>0.76505</cdr:y>
+    </cdr:to>
+    <cdr:sp macro="" textlink="">
+      <cdr:nvSpPr>
+        <cdr:cNvPr id="9" name="TextBox 1"/>
+        <cdr:cNvSpPr txBox="1"/>
+      </cdr:nvSpPr>
+      <cdr:spPr>
+        <a:xfrm xmlns:a="http://schemas.openxmlformats.org/drawingml/2006/main">
+          <a:off x="1306634" y="4530480"/>
+          <a:ext cx="1025769" cy="280866"/>
+        </a:xfrm>
+        <a:prstGeom xmlns:a="http://schemas.openxmlformats.org/drawingml/2006/main" prst="rect">
+          <a:avLst/>
+        </a:prstGeom>
+        <a:solidFill xmlns:a="http://schemas.openxmlformats.org/drawingml/2006/main">
+          <a:schemeClr val="tx1">
+            <a:lumMod val="95000"/>
+            <a:lumOff val="5000"/>
+          </a:schemeClr>
+        </a:solidFill>
+        <a:ln xmlns:a="http://schemas.openxmlformats.org/drawingml/2006/main">
+          <a:solidFill>
+            <a:sysClr val="windowText" lastClr="000000"/>
+          </a:solidFill>
+        </a:ln>
+      </cdr:spPr>
+      <cdr:txBody>
+        <a:bodyPr xmlns:a="http://schemas.openxmlformats.org/drawingml/2006/main" wrap="square" rtlCol="0"/>
+        <a:lstStyle xmlns:a="http://schemas.openxmlformats.org/drawingml/2006/main">
+          <a:lvl1pPr marL="0" indent="0">
+            <a:defRPr sz="1100">
+              <a:latin typeface="+mn-lt"/>
+              <a:ea typeface="+mn-ea"/>
+              <a:cs typeface="+mn-cs"/>
+            </a:defRPr>
+          </a:lvl1pPr>
+          <a:lvl2pPr marL="457200" indent="0">
+            <a:defRPr sz="1100">
+              <a:latin typeface="+mn-lt"/>
+              <a:ea typeface="+mn-ea"/>
+              <a:cs typeface="+mn-cs"/>
+            </a:defRPr>
+          </a:lvl2pPr>
+          <a:lvl3pPr marL="914400" indent="0">
+            <a:defRPr sz="1100">
+              <a:latin typeface="+mn-lt"/>
+              <a:ea typeface="+mn-ea"/>
+              <a:cs typeface="+mn-cs"/>
+            </a:defRPr>
+          </a:lvl3pPr>
+          <a:lvl4pPr marL="1371600" indent="0">
+            <a:defRPr sz="1100">
+              <a:latin typeface="+mn-lt"/>
+              <a:ea typeface="+mn-ea"/>
+              <a:cs typeface="+mn-cs"/>
+            </a:defRPr>
+          </a:lvl4pPr>
+          <a:lvl5pPr marL="1828800" indent="0">
+            <a:defRPr sz="1100">
+              <a:latin typeface="+mn-lt"/>
+              <a:ea typeface="+mn-ea"/>
+              <a:cs typeface="+mn-cs"/>
+            </a:defRPr>
+          </a:lvl5pPr>
+          <a:lvl6pPr marL="2286000" indent="0">
+            <a:defRPr sz="1100">
+              <a:latin typeface="+mn-lt"/>
+              <a:ea typeface="+mn-ea"/>
+              <a:cs typeface="+mn-cs"/>
+            </a:defRPr>
+          </a:lvl6pPr>
+          <a:lvl7pPr marL="2743200" indent="0">
+            <a:defRPr sz="1100">
+              <a:latin typeface="+mn-lt"/>
+              <a:ea typeface="+mn-ea"/>
+              <a:cs typeface="+mn-cs"/>
+            </a:defRPr>
+          </a:lvl7pPr>
+          <a:lvl8pPr marL="3200400" indent="0">
+            <a:defRPr sz="1100">
+              <a:latin typeface="+mn-lt"/>
+              <a:ea typeface="+mn-ea"/>
+              <a:cs typeface="+mn-cs"/>
+            </a:defRPr>
+          </a:lvl8pPr>
+          <a:lvl9pPr marL="3657600" indent="0">
+            <a:defRPr sz="1100">
+              <a:latin typeface="+mn-lt"/>
+              <a:ea typeface="+mn-ea"/>
+              <a:cs typeface="+mn-cs"/>
+            </a:defRPr>
+          </a:lvl9pPr>
+        </a:lstStyle>
+        <a:p xmlns:a="http://schemas.openxmlformats.org/drawingml/2006/main">
+          <a:pPr algn="ctr"/>
+          <a:r>
+            <a:rPr lang="en-US" sz="1100" b="1">
+              <a:solidFill>
+                <a:schemeClr val="bg1"/>
+              </a:solidFill>
+              <a:latin typeface="Times New Roman" pitchFamily="18" charset="0"/>
+              <a:cs typeface="Times New Roman" pitchFamily="18" charset="0"/>
+            </a:rPr>
+            <a:t>DRAGONSat</a:t>
+          </a:r>
+        </a:p>
+      </cdr:txBody>
+    </cdr:sp>
+  </cdr:relSizeAnchor>
+  <cdr:relSizeAnchor xmlns:cdr="http://schemas.openxmlformats.org/drawingml/2006/chartDrawing">
+    <cdr:from>
+      <cdr:x>0.07606</cdr:x>
+      <cdr:y>0.80388</cdr:y>
+    </cdr:from>
+    <cdr:to>
+      <cdr:x>0.19155</cdr:x>
+      <cdr:y>0.85049</cdr:y>
+    </cdr:to>
+    <cdr:sp macro="" textlink="">
+      <cdr:nvSpPr>
+        <cdr:cNvPr id="12" name="TextBox 1"/>
+        <cdr:cNvSpPr txBox="1"/>
+      </cdr:nvSpPr>
+      <cdr:spPr>
+        <a:xfrm xmlns:a="http://schemas.openxmlformats.org/drawingml/2006/main">
+          <a:off x="659423" y="5055577"/>
+          <a:ext cx="1001346" cy="293077"/>
+        </a:xfrm>
+        <a:prstGeom xmlns:a="http://schemas.openxmlformats.org/drawingml/2006/main" prst="rect">
+          <a:avLst/>
+        </a:prstGeom>
+        <a:solidFill xmlns:a="http://schemas.openxmlformats.org/drawingml/2006/main">
+          <a:schemeClr val="tx1">
+            <a:lumMod val="95000"/>
+            <a:lumOff val="5000"/>
+          </a:schemeClr>
+        </a:solidFill>
+        <a:ln xmlns:a="http://schemas.openxmlformats.org/drawingml/2006/main">
+          <a:solidFill>
+            <a:sysClr val="windowText" lastClr="000000"/>
+          </a:solidFill>
+        </a:ln>
+      </cdr:spPr>
+      <cdr:txBody>
+        <a:bodyPr xmlns:a="http://schemas.openxmlformats.org/drawingml/2006/main" wrap="square" rtlCol="0"/>
+        <a:lstStyle xmlns:a="http://schemas.openxmlformats.org/drawingml/2006/main">
+          <a:lvl1pPr marL="0" indent="0">
+            <a:defRPr sz="1100">
+              <a:latin typeface="Calibri"/>
+            </a:defRPr>
+          </a:lvl1pPr>
+          <a:lvl2pPr marL="457200" indent="0">
+            <a:defRPr sz="1100">
+              <a:latin typeface="Calibri"/>
+            </a:defRPr>
+          </a:lvl2pPr>
+          <a:lvl3pPr marL="914400" indent="0">
+            <a:defRPr sz="1100">
+              <a:latin typeface="Calibri"/>
+            </a:defRPr>
+          </a:lvl3pPr>
+          <a:lvl4pPr marL="1371600" indent="0">
+            <a:defRPr sz="1100">
+              <a:latin typeface="Calibri"/>
+            </a:defRPr>
+          </a:lvl4pPr>
+          <a:lvl5pPr marL="1828800" indent="0">
+            <a:defRPr sz="1100">
+              <a:latin typeface="Calibri"/>
+            </a:defRPr>
+          </a:lvl5pPr>
+          <a:lvl6pPr marL="2286000" indent="0">
+            <a:defRPr sz="1100">
+              <a:latin typeface="Calibri"/>
+            </a:defRPr>
+          </a:lvl6pPr>
+          <a:lvl7pPr marL="2743200" indent="0">
+            <a:defRPr sz="1100">
+              <a:latin typeface="Calibri"/>
+            </a:defRPr>
+          </a:lvl7pPr>
+          <a:lvl8pPr marL="3200400" indent="0">
+            <a:defRPr sz="1100">
+              <a:latin typeface="Calibri"/>
+            </a:defRPr>
+          </a:lvl8pPr>
+          <a:lvl9pPr marL="3657600" indent="0">
+            <a:defRPr sz="1100">
+              <a:latin typeface="Calibri"/>
+            </a:defRPr>
+          </a:lvl9pPr>
+        </a:lstStyle>
+        <a:p xmlns:a="http://schemas.openxmlformats.org/drawingml/2006/main">
+          <a:pPr algn="ctr"/>
+          <a:r>
+            <a:rPr lang="en-US" sz="1100" b="1">
+              <a:solidFill>
+                <a:schemeClr val="bg1"/>
+              </a:solidFill>
+              <a:latin typeface="Times New Roman" pitchFamily="18" charset="0"/>
+              <a:cs typeface="Times New Roman" pitchFamily="18" charset="0"/>
+            </a:rPr>
+            <a:t>Aerocube-4</a:t>
+          </a:r>
+        </a:p>
+      </cdr:txBody>
+    </cdr:sp>
+  </cdr:relSizeAnchor>
+  <cdr:relSizeAnchor xmlns:cdr="http://schemas.openxmlformats.org/drawingml/2006/chartDrawing">
+    <cdr:from>
+      <cdr:x>0.08732</cdr:x>
+      <cdr:y>0.85049</cdr:y>
+    </cdr:from>
+    <cdr:to>
+      <cdr:x>0.1338</cdr:x>
+      <cdr:y>0.89515</cdr:y>
+    </cdr:to>
+    <cdr:sp macro="" textlink="">
+      <cdr:nvSpPr>
+        <cdr:cNvPr id="15" name="Straight Arrow Connector 14"/>
+        <cdr:cNvSpPr/>
+      </cdr:nvSpPr>
+      <cdr:spPr>
+        <a:xfrm xmlns:a="http://schemas.openxmlformats.org/drawingml/2006/main" flipH="1">
+          <a:off x="757114" y="5348654"/>
+          <a:ext cx="402981" cy="280865"/>
+        </a:xfrm>
+        <a:prstGeom xmlns:a="http://schemas.openxmlformats.org/drawingml/2006/main" prst="straightConnector1">
+          <a:avLst/>
+        </a:prstGeom>
+        <a:ln xmlns:a="http://schemas.openxmlformats.org/drawingml/2006/main" w="38100">
+          <a:solidFill>
+            <a:sysClr val="windowText" lastClr="000000"/>
+          </a:solidFill>
+          <a:headEnd type="none" w="med" len="med"/>
+          <a:tailEnd type="triangle" w="med" len="med"/>
+        </a:ln>
+      </cdr:spPr>
+      <cdr:style>
+        <a:lnRef xmlns:a="http://schemas.openxmlformats.org/drawingml/2006/main" idx="1">
+          <a:schemeClr val="accent1"/>
+        </a:lnRef>
+        <a:fillRef xmlns:a="http://schemas.openxmlformats.org/drawingml/2006/main" idx="0">
+          <a:schemeClr val="accent1"/>
+        </a:fillRef>
+        <a:effectRef xmlns:a="http://schemas.openxmlformats.org/drawingml/2006/main" idx="0">
+          <a:schemeClr val="accent1"/>
+        </a:effectRef>
+        <a:fontRef xmlns:a="http://schemas.openxmlformats.org/drawingml/2006/main" idx="minor">
+          <a:schemeClr val="tx1"/>
+        </a:fontRef>
+      </cdr:style>
+      <cdr:txBody>
+        <a:bodyPr xmlns:a="http://schemas.openxmlformats.org/drawingml/2006/main" vertOverflow="clip"/>
+        <a:lstStyle xmlns:a="http://schemas.openxmlformats.org/drawingml/2006/main"/>
+        <a:p xmlns:a="http://schemas.openxmlformats.org/drawingml/2006/main">
+          <a:endParaRPr lang="en-US"/>
+        </a:p>
+      </cdr:txBody>
+    </cdr:sp>
+  </cdr:relSizeAnchor>
+  <cdr:relSizeAnchor xmlns:cdr="http://schemas.openxmlformats.org/drawingml/2006/chartDrawing">
+    <cdr:from>
+      <cdr:x>0.20845</cdr:x>
+      <cdr:y>0.76505</cdr:y>
+    </cdr:from>
+    <cdr:to>
+      <cdr:x>0.2662</cdr:x>
+      <cdr:y>0.8932</cdr:y>
+    </cdr:to>
+    <cdr:sp macro="" textlink="">
+      <cdr:nvSpPr>
+        <cdr:cNvPr id="16" name="Straight Arrow Connector 15"/>
+        <cdr:cNvSpPr/>
+      </cdr:nvSpPr>
+      <cdr:spPr>
+        <a:xfrm xmlns:a="http://schemas.openxmlformats.org/drawingml/2006/main">
+          <a:off x="1807309" y="4811346"/>
+          <a:ext cx="500672" cy="805962"/>
+        </a:xfrm>
+        <a:prstGeom xmlns:a="http://schemas.openxmlformats.org/drawingml/2006/main" prst="straightConnector1">
+          <a:avLst/>
+        </a:prstGeom>
+        <a:ln xmlns:a="http://schemas.openxmlformats.org/drawingml/2006/main" w="38100">
+          <a:solidFill>
+            <a:sysClr val="windowText" lastClr="000000"/>
+          </a:solidFill>
+          <a:headEnd type="none" w="med" len="med"/>
+          <a:tailEnd type="triangle" w="med" len="med"/>
+        </a:ln>
+      </cdr:spPr>
+      <cdr:style>
+        <a:lnRef xmlns:a="http://schemas.openxmlformats.org/drawingml/2006/main" idx="1">
+          <a:schemeClr val="accent1"/>
+        </a:lnRef>
+        <a:fillRef xmlns:a="http://schemas.openxmlformats.org/drawingml/2006/main" idx="0">
+          <a:schemeClr val="accent1"/>
+        </a:fillRef>
+        <a:effectRef xmlns:a="http://schemas.openxmlformats.org/drawingml/2006/main" idx="0">
+          <a:schemeClr val="accent1"/>
+        </a:effectRef>
+        <a:fontRef xmlns:a="http://schemas.openxmlformats.org/drawingml/2006/main" idx="minor">
+          <a:schemeClr val="tx1"/>
+        </a:fontRef>
+      </cdr:style>
+      <cdr:txBody>
+        <a:bodyPr xmlns:a="http://schemas.openxmlformats.org/drawingml/2006/main"/>
+        <a:lstStyle xmlns:a="http://schemas.openxmlformats.org/drawingml/2006/main">
+          <a:lvl1pPr marL="0" indent="0">
+            <a:defRPr sz="1100">
+              <a:solidFill>
+                <a:schemeClr val="tx1"/>
+              </a:solidFill>
+              <a:latin typeface="+mn-lt"/>
+              <a:ea typeface="+mn-ea"/>
+              <a:cs typeface="+mn-cs"/>
+            </a:defRPr>
+          </a:lvl1pPr>
+          <a:lvl2pPr marL="457200" indent="0">
+            <a:defRPr sz="1100">
+              <a:solidFill>
+                <a:schemeClr val="tx1"/>
+              </a:solidFill>
+              <a:latin typeface="+mn-lt"/>
+              <a:ea typeface="+mn-ea"/>
+              <a:cs typeface="+mn-cs"/>
+            </a:defRPr>
+          </a:lvl2pPr>
+          <a:lvl3pPr marL="914400" indent="0">
+            <a:defRPr sz="1100">
+              <a:solidFill>
+                <a:schemeClr val="tx1"/>
+              </a:solidFill>
+              <a:latin typeface="+mn-lt"/>
+              <a:ea typeface="+mn-ea"/>
+              <a:cs typeface="+mn-cs"/>
+            </a:defRPr>
+          </a:lvl3pPr>
+          <a:lvl4pPr marL="1371600" indent="0">
+            <a:defRPr sz="1100">
+              <a:solidFill>
+                <a:schemeClr val="tx1"/>
+              </a:solidFill>
+              <a:latin typeface="+mn-lt"/>
+              <a:ea typeface="+mn-ea"/>
+              <a:cs typeface="+mn-cs"/>
+            </a:defRPr>
+          </a:lvl4pPr>
+          <a:lvl5pPr marL="1828800" indent="0">
+            <a:defRPr sz="1100">
+              <a:solidFill>
+                <a:schemeClr val="tx1"/>
+              </a:solidFill>
+              <a:latin typeface="+mn-lt"/>
+              <a:ea typeface="+mn-ea"/>
+              <a:cs typeface="+mn-cs"/>
+            </a:defRPr>
+          </a:lvl5pPr>
+          <a:lvl6pPr marL="2286000" indent="0">
+            <a:defRPr sz="1100">
+              <a:solidFill>
+                <a:schemeClr val="tx1"/>
+              </a:solidFill>
+              <a:latin typeface="+mn-lt"/>
+              <a:ea typeface="+mn-ea"/>
+              <a:cs typeface="+mn-cs"/>
+            </a:defRPr>
+          </a:lvl6pPr>
+          <a:lvl7pPr marL="2743200" indent="0">
+            <a:defRPr sz="1100">
+              <a:solidFill>
+                <a:schemeClr val="tx1"/>
+              </a:solidFill>
+              <a:latin typeface="+mn-lt"/>
+              <a:ea typeface="+mn-ea"/>
+              <a:cs typeface="+mn-cs"/>
+            </a:defRPr>
+          </a:lvl7pPr>
+          <a:lvl8pPr marL="3200400" indent="0">
+            <a:defRPr sz="1100">
+              <a:solidFill>
+                <a:schemeClr val="tx1"/>
+              </a:solidFill>
+              <a:latin typeface="+mn-lt"/>
+              <a:ea typeface="+mn-ea"/>
+              <a:cs typeface="+mn-cs"/>
+            </a:defRPr>
+          </a:lvl8pPr>
+          <a:lvl9pPr marL="3657600" indent="0">
+            <a:defRPr sz="1100">
+              <a:solidFill>
+                <a:schemeClr val="tx1"/>
+              </a:solidFill>
+              <a:latin typeface="+mn-lt"/>
+              <a:ea typeface="+mn-ea"/>
+              <a:cs typeface="+mn-cs"/>
+            </a:defRPr>
+          </a:lvl9pPr>
+        </a:lstStyle>
+        <a:p xmlns:a="http://schemas.openxmlformats.org/drawingml/2006/main">
+          <a:endParaRPr lang="en-US"/>
+        </a:p>
+      </cdr:txBody>
+    </cdr:sp>
+  </cdr:relSizeAnchor>
+  <cdr:relSizeAnchor xmlns:cdr="http://schemas.openxmlformats.org/drawingml/2006/chartDrawing">
+    <cdr:from>
+      <cdr:x>0.28732</cdr:x>
+      <cdr:y>0.80971</cdr:y>
+    </cdr:from>
+    <cdr:to>
+      <cdr:x>0.34507</cdr:x>
+      <cdr:y>0.89903</cdr:y>
+    </cdr:to>
+    <cdr:sp macro="" textlink="">
+      <cdr:nvSpPr>
+        <cdr:cNvPr id="17" name="Straight Arrow Connector 16"/>
+        <cdr:cNvSpPr/>
+      </cdr:nvSpPr>
+      <cdr:spPr>
+        <a:xfrm xmlns:a="http://schemas.openxmlformats.org/drawingml/2006/main" flipH="1">
+          <a:off x="2491154" y="5092213"/>
+          <a:ext cx="500673" cy="561730"/>
+        </a:xfrm>
+        <a:prstGeom xmlns:a="http://schemas.openxmlformats.org/drawingml/2006/main" prst="straightConnector1">
+          <a:avLst/>
+        </a:prstGeom>
+        <a:ln xmlns:a="http://schemas.openxmlformats.org/drawingml/2006/main" w="38100">
+          <a:solidFill>
+            <a:sysClr val="windowText" lastClr="000000"/>
+          </a:solidFill>
+          <a:headEnd type="none" w="med" len="med"/>
+          <a:tailEnd type="triangle" w="med" len="med"/>
+        </a:ln>
+      </cdr:spPr>
+      <cdr:style>
+        <a:lnRef xmlns:a="http://schemas.openxmlformats.org/drawingml/2006/main" idx="1">
+          <a:schemeClr val="accent1"/>
+        </a:lnRef>
+        <a:fillRef xmlns:a="http://schemas.openxmlformats.org/drawingml/2006/main" idx="0">
+          <a:schemeClr val="accent1"/>
+        </a:fillRef>
+        <a:effectRef xmlns:a="http://schemas.openxmlformats.org/drawingml/2006/main" idx="0">
+          <a:schemeClr val="accent1"/>
+        </a:effectRef>
+        <a:fontRef xmlns:a="http://schemas.openxmlformats.org/drawingml/2006/main" idx="minor">
+          <a:schemeClr val="tx1"/>
+        </a:fontRef>
+      </cdr:style>
+      <cdr:txBody>
+        <a:bodyPr xmlns:a="http://schemas.openxmlformats.org/drawingml/2006/main"/>
+        <a:lstStyle xmlns:a="http://schemas.openxmlformats.org/drawingml/2006/main">
+          <a:lvl1pPr marL="0" indent="0">
+            <a:defRPr sz="1100">
+              <a:solidFill>
+                <a:schemeClr val="tx1"/>
+              </a:solidFill>
+              <a:latin typeface="+mn-lt"/>
+              <a:ea typeface="+mn-ea"/>
+              <a:cs typeface="+mn-cs"/>
+            </a:defRPr>
+          </a:lvl1pPr>
+          <a:lvl2pPr marL="457200" indent="0">
+            <a:defRPr sz="1100">
+              <a:solidFill>
+                <a:schemeClr val="tx1"/>
+              </a:solidFill>
+              <a:latin typeface="+mn-lt"/>
+              <a:ea typeface="+mn-ea"/>
+              <a:cs typeface="+mn-cs"/>
+            </a:defRPr>
+          </a:lvl2pPr>
+          <a:lvl3pPr marL="914400" indent="0">
+            <a:defRPr sz="1100">
+              <a:solidFill>
+                <a:schemeClr val="tx1"/>
+              </a:solidFill>
+              <a:latin typeface="+mn-lt"/>
+              <a:ea typeface="+mn-ea"/>
+              <a:cs typeface="+mn-cs"/>
+            </a:defRPr>
+          </a:lvl3pPr>
+          <a:lvl4pPr marL="1371600" indent="0">
+            <a:defRPr sz="1100">
+              <a:solidFill>
+                <a:schemeClr val="tx1"/>
+              </a:solidFill>
+              <a:latin typeface="+mn-lt"/>
+              <a:ea typeface="+mn-ea"/>
+              <a:cs typeface="+mn-cs"/>
+            </a:defRPr>
+          </a:lvl4pPr>
+          <a:lvl5pPr marL="1828800" indent="0">
+            <a:defRPr sz="1100">
+              <a:solidFill>
+                <a:schemeClr val="tx1"/>
+              </a:solidFill>
+              <a:latin typeface="+mn-lt"/>
+              <a:ea typeface="+mn-ea"/>
+              <a:cs typeface="+mn-cs"/>
+            </a:defRPr>
+          </a:lvl5pPr>
+          <a:lvl6pPr marL="2286000" indent="0">
+            <a:defRPr sz="1100">
+              <a:solidFill>
+                <a:schemeClr val="tx1"/>
+              </a:solidFill>
+              <a:latin typeface="+mn-lt"/>
+              <a:ea typeface="+mn-ea"/>
+              <a:cs typeface="+mn-cs"/>
+            </a:defRPr>
+          </a:lvl6pPr>
+          <a:lvl7pPr marL="2743200" indent="0">
+            <a:defRPr sz="1100">
+              <a:solidFill>
+                <a:schemeClr val="tx1"/>
+              </a:solidFill>
+              <a:latin typeface="+mn-lt"/>
+              <a:ea typeface="+mn-ea"/>
+              <a:cs typeface="+mn-cs"/>
+            </a:defRPr>
+          </a:lvl7pPr>
+          <a:lvl8pPr marL="3200400" indent="0">
+            <a:defRPr sz="1100">
+              <a:solidFill>
+                <a:schemeClr val="tx1"/>
+              </a:solidFill>
+              <a:latin typeface="+mn-lt"/>
+              <a:ea typeface="+mn-ea"/>
+              <a:cs typeface="+mn-cs"/>
+            </a:defRPr>
+          </a:lvl8pPr>
+          <a:lvl9pPr marL="3657600" indent="0">
+            <a:defRPr sz="1100">
+              <a:solidFill>
+                <a:schemeClr val="tx1"/>
+              </a:solidFill>
+              <a:latin typeface="+mn-lt"/>
+              <a:ea typeface="+mn-ea"/>
+              <a:cs typeface="+mn-cs"/>
+            </a:defRPr>
+          </a:lvl9pPr>
+        </a:lstStyle>
+        <a:p xmlns:a="http://schemas.openxmlformats.org/drawingml/2006/main">
+          <a:endParaRPr lang="en-US"/>
+        </a:p>
+      </cdr:txBody>
+    </cdr:sp>
+  </cdr:relSizeAnchor>
+  <cdr:relSizeAnchor xmlns:cdr="http://schemas.openxmlformats.org/drawingml/2006/chartDrawing">
+    <cdr:from>
+      <cdr:x>0.08693</cdr:x>
+      <cdr:y>0.24555</cdr:y>
+    </cdr:from>
+    <cdr:to>
+      <cdr:x>0.36017</cdr:x>
+      <cdr:y>0.29991</cdr:y>
+    </cdr:to>
+    <cdr:sp macro="" textlink="">
+      <cdr:nvSpPr>
+        <cdr:cNvPr id="19" name="TextBox 1"/>
+        <cdr:cNvSpPr txBox="1"/>
+      </cdr:nvSpPr>
+      <cdr:spPr>
+        <a:xfrm xmlns:a="http://schemas.openxmlformats.org/drawingml/2006/main">
+          <a:off x="753696" y="1544271"/>
+          <a:ext cx="2369043" cy="341867"/>
+        </a:xfrm>
+        <a:prstGeom xmlns:a="http://schemas.openxmlformats.org/drawingml/2006/main" prst="rect">
+          <a:avLst/>
+        </a:prstGeom>
+        <a:solidFill xmlns:a="http://schemas.openxmlformats.org/drawingml/2006/main">
+          <a:schemeClr val="tx1">
+            <a:lumMod val="95000"/>
+            <a:lumOff val="5000"/>
+          </a:schemeClr>
+        </a:solidFill>
+        <a:ln xmlns:a="http://schemas.openxmlformats.org/drawingml/2006/main">
+          <a:solidFill>
+            <a:sysClr val="windowText" lastClr="000000"/>
+          </a:solidFill>
+        </a:ln>
+      </cdr:spPr>
+      <cdr:txBody>
+        <a:bodyPr xmlns:a="http://schemas.openxmlformats.org/drawingml/2006/main" wrap="square" rtlCol="0"/>
+        <a:lstStyle xmlns:a="http://schemas.openxmlformats.org/drawingml/2006/main">
+          <a:lvl1pPr marL="0" indent="0">
+            <a:defRPr sz="1100">
+              <a:latin typeface="+mn-lt"/>
+              <a:ea typeface="+mn-ea"/>
+              <a:cs typeface="+mn-cs"/>
+            </a:defRPr>
+          </a:lvl1pPr>
+          <a:lvl2pPr marL="457200" indent="0">
+            <a:defRPr sz="1100">
+              <a:latin typeface="+mn-lt"/>
+              <a:ea typeface="+mn-ea"/>
+              <a:cs typeface="+mn-cs"/>
+            </a:defRPr>
+          </a:lvl2pPr>
+          <a:lvl3pPr marL="914400" indent="0">
+            <a:defRPr sz="1100">
+              <a:latin typeface="+mn-lt"/>
+              <a:ea typeface="+mn-ea"/>
+              <a:cs typeface="+mn-cs"/>
+            </a:defRPr>
+          </a:lvl3pPr>
+          <a:lvl4pPr marL="1371600" indent="0">
+            <a:defRPr sz="1100">
+              <a:latin typeface="+mn-lt"/>
+              <a:ea typeface="+mn-ea"/>
+              <a:cs typeface="+mn-cs"/>
+            </a:defRPr>
+          </a:lvl4pPr>
+          <a:lvl5pPr marL="1828800" indent="0">
+            <a:defRPr sz="1100">
+              <a:latin typeface="+mn-lt"/>
+              <a:ea typeface="+mn-ea"/>
+              <a:cs typeface="+mn-cs"/>
+            </a:defRPr>
+          </a:lvl5pPr>
+          <a:lvl6pPr marL="2286000" indent="0">
+            <a:defRPr sz="1100">
+              <a:latin typeface="+mn-lt"/>
+              <a:ea typeface="+mn-ea"/>
+              <a:cs typeface="+mn-cs"/>
+            </a:defRPr>
+          </a:lvl6pPr>
+          <a:lvl7pPr marL="2743200" indent="0">
+            <a:defRPr sz="1100">
+              <a:latin typeface="+mn-lt"/>
+              <a:ea typeface="+mn-ea"/>
+              <a:cs typeface="+mn-cs"/>
+            </a:defRPr>
+          </a:lvl7pPr>
+          <a:lvl8pPr marL="3200400" indent="0">
+            <a:defRPr sz="1100">
+              <a:latin typeface="+mn-lt"/>
+              <a:ea typeface="+mn-ea"/>
+              <a:cs typeface="+mn-cs"/>
+            </a:defRPr>
+          </a:lvl8pPr>
+          <a:lvl9pPr marL="3657600" indent="0">
+            <a:defRPr sz="1100">
+              <a:latin typeface="+mn-lt"/>
+              <a:ea typeface="+mn-ea"/>
+              <a:cs typeface="+mn-cs"/>
+            </a:defRPr>
+          </a:lvl9pPr>
+        </a:lstStyle>
+        <a:p xmlns:a="http://schemas.openxmlformats.org/drawingml/2006/main">
+          <a:pPr algn="ctr"/>
+          <a:r>
+            <a:rPr lang="en-US" sz="1400" b="1" dirty="0">
+              <a:solidFill>
+                <a:schemeClr val="bg1"/>
+              </a:solidFill>
+              <a:latin typeface="Times New Roman" pitchFamily="18" charset="0"/>
+              <a:cs typeface="Times New Roman" pitchFamily="18" charset="0"/>
+            </a:rPr>
+            <a:t>CubeSat Missions: 1-15 kg</a:t>
+          </a:r>
+        </a:p>
+      </cdr:txBody>
+    </cdr:sp>
+  </cdr:relSizeAnchor>
+  <cdr:relSizeAnchor xmlns:cdr="http://schemas.openxmlformats.org/drawingml/2006/chartDrawing">
+    <cdr:from>
+      <cdr:x>0.37696</cdr:x>
+      <cdr:y>0.24555</cdr:y>
+    </cdr:from>
+    <cdr:to>
+      <cdr:x>0.67133</cdr:x>
+      <cdr:y>0.29992</cdr:y>
+    </cdr:to>
+    <cdr:sp macro="" textlink="">
+      <cdr:nvSpPr>
+        <cdr:cNvPr id="21" name="TextBox 1"/>
+        <cdr:cNvSpPr txBox="1"/>
+      </cdr:nvSpPr>
+      <cdr:spPr>
+        <a:xfrm xmlns:a="http://schemas.openxmlformats.org/drawingml/2006/main">
+          <a:off x="3268296" y="1544271"/>
+          <a:ext cx="2552244" cy="341930"/>
+        </a:xfrm>
+        <a:prstGeom xmlns:a="http://schemas.openxmlformats.org/drawingml/2006/main" prst="rect">
+          <a:avLst/>
+        </a:prstGeom>
+        <a:solidFill xmlns:a="http://schemas.openxmlformats.org/drawingml/2006/main">
+          <a:schemeClr val="tx1">
+            <a:lumMod val="65000"/>
+            <a:lumOff val="35000"/>
+          </a:schemeClr>
+        </a:solidFill>
+        <a:ln xmlns:a="http://schemas.openxmlformats.org/drawingml/2006/main">
+          <a:solidFill>
+            <a:sysClr val="windowText" lastClr="000000"/>
+          </a:solidFill>
+        </a:ln>
+      </cdr:spPr>
+      <cdr:txBody>
+        <a:bodyPr xmlns:a="http://schemas.openxmlformats.org/drawingml/2006/main" wrap="square" rtlCol="0"/>
+        <a:lstStyle xmlns:a="http://schemas.openxmlformats.org/drawingml/2006/main">
+          <a:lvl1pPr marL="0" indent="0">
+            <a:defRPr sz="1100">
+              <a:latin typeface="+mn-lt"/>
+              <a:ea typeface="+mn-ea"/>
+              <a:cs typeface="+mn-cs"/>
+            </a:defRPr>
+          </a:lvl1pPr>
+          <a:lvl2pPr marL="457200" indent="0">
+            <a:defRPr sz="1100">
+              <a:latin typeface="+mn-lt"/>
+              <a:ea typeface="+mn-ea"/>
+              <a:cs typeface="+mn-cs"/>
+            </a:defRPr>
+          </a:lvl2pPr>
+          <a:lvl3pPr marL="914400" indent="0">
+            <a:defRPr sz="1100">
+              <a:latin typeface="+mn-lt"/>
+              <a:ea typeface="+mn-ea"/>
+              <a:cs typeface="+mn-cs"/>
+            </a:defRPr>
+          </a:lvl3pPr>
+          <a:lvl4pPr marL="1371600" indent="0">
+            <a:defRPr sz="1100">
+              <a:latin typeface="+mn-lt"/>
+              <a:ea typeface="+mn-ea"/>
+              <a:cs typeface="+mn-cs"/>
+            </a:defRPr>
+          </a:lvl4pPr>
+          <a:lvl5pPr marL="1828800" indent="0">
+            <a:defRPr sz="1100">
+              <a:latin typeface="+mn-lt"/>
+              <a:ea typeface="+mn-ea"/>
+              <a:cs typeface="+mn-cs"/>
+            </a:defRPr>
+          </a:lvl5pPr>
+          <a:lvl6pPr marL="2286000" indent="0">
+            <a:defRPr sz="1100">
+              <a:latin typeface="+mn-lt"/>
+              <a:ea typeface="+mn-ea"/>
+              <a:cs typeface="+mn-cs"/>
+            </a:defRPr>
+          </a:lvl6pPr>
+          <a:lvl7pPr marL="2743200" indent="0">
+            <a:defRPr sz="1100">
+              <a:latin typeface="+mn-lt"/>
+              <a:ea typeface="+mn-ea"/>
+              <a:cs typeface="+mn-cs"/>
+            </a:defRPr>
+          </a:lvl7pPr>
+          <a:lvl8pPr marL="3200400" indent="0">
+            <a:defRPr sz="1100">
+              <a:latin typeface="+mn-lt"/>
+              <a:ea typeface="+mn-ea"/>
+              <a:cs typeface="+mn-cs"/>
+            </a:defRPr>
+          </a:lvl8pPr>
+          <a:lvl9pPr marL="3657600" indent="0">
+            <a:defRPr sz="1100">
+              <a:latin typeface="+mn-lt"/>
+              <a:ea typeface="+mn-ea"/>
+              <a:cs typeface="+mn-cs"/>
+            </a:defRPr>
+          </a:lvl9pPr>
+        </a:lstStyle>
+        <a:p xmlns:a="http://schemas.openxmlformats.org/drawingml/2006/main">
+          <a:pPr algn="ctr"/>
+          <a:r>
+            <a:rPr lang="en-US" sz="1400" b="1" dirty="0" smtClean="0">
+              <a:solidFill>
+                <a:schemeClr val="bg1"/>
+              </a:solidFill>
+              <a:latin typeface="Times New Roman" pitchFamily="18" charset="0"/>
+              <a:cs typeface="Times New Roman" pitchFamily="18" charset="0"/>
+            </a:rPr>
+            <a:t> </a:t>
+          </a:r>
+          <a:r>
+            <a:rPr lang="en-US" sz="1400" b="1" dirty="0" err="1" smtClean="0">
+              <a:solidFill>
+                <a:schemeClr val="bg1"/>
+              </a:solidFill>
+              <a:latin typeface="Times New Roman" pitchFamily="18" charset="0"/>
+              <a:cs typeface="Times New Roman" pitchFamily="18" charset="0"/>
+            </a:rPr>
+            <a:t>Microsat</a:t>
+          </a:r>
+          <a:r>
+            <a:rPr lang="en-US" sz="1400" b="1" baseline="0" dirty="0" smtClean="0">
+              <a:solidFill>
+                <a:schemeClr val="bg1"/>
+              </a:solidFill>
+              <a:latin typeface="Times New Roman" pitchFamily="18" charset="0"/>
+              <a:cs typeface="Times New Roman" pitchFamily="18" charset="0"/>
+            </a:rPr>
+            <a:t> </a:t>
+          </a:r>
+          <a:r>
+            <a:rPr lang="en-US" sz="1400" b="1" dirty="0" smtClean="0">
+              <a:solidFill>
+                <a:schemeClr val="bg1"/>
+              </a:solidFill>
+              <a:latin typeface="Times New Roman" pitchFamily="18" charset="0"/>
+              <a:cs typeface="Times New Roman" pitchFamily="18" charset="0"/>
+            </a:rPr>
+            <a:t>Missions: 10-100 kg</a:t>
+          </a:r>
+          <a:endParaRPr lang="en-US" sz="1400" b="1" dirty="0">
+            <a:solidFill>
+              <a:schemeClr val="bg1"/>
+            </a:solidFill>
+            <a:latin typeface="Times New Roman" pitchFamily="18" charset="0"/>
+            <a:cs typeface="Times New Roman" pitchFamily="18" charset="0"/>
+          </a:endParaRPr>
+        </a:p>
+      </cdr:txBody>
+    </cdr:sp>
+  </cdr:relSizeAnchor>
+  <cdr:relSizeAnchor xmlns:cdr="http://schemas.openxmlformats.org/drawingml/2006/chartDrawing">
+    <cdr:from>
+      <cdr:x>0.69335</cdr:x>
+      <cdr:y>0.24555</cdr:y>
+    </cdr:from>
+    <cdr:to>
+      <cdr:x>0.99758</cdr:x>
+      <cdr:y>0.29992</cdr:y>
+    </cdr:to>
+    <cdr:sp macro="" textlink="">
+      <cdr:nvSpPr>
+        <cdr:cNvPr id="23" name="TextBox 1"/>
+        <cdr:cNvSpPr txBox="1"/>
+      </cdr:nvSpPr>
+      <cdr:spPr>
+        <a:xfrm xmlns:a="http://schemas.openxmlformats.org/drawingml/2006/main">
+          <a:off x="6011496" y="1544271"/>
+          <a:ext cx="2637733" cy="341929"/>
+        </a:xfrm>
+        <a:prstGeom xmlns:a="http://schemas.openxmlformats.org/drawingml/2006/main" prst="rect">
+          <a:avLst/>
+        </a:prstGeom>
+        <a:solidFill xmlns:a="http://schemas.openxmlformats.org/drawingml/2006/main">
+          <a:schemeClr val="bg2">
+            <a:lumMod val="75000"/>
+          </a:schemeClr>
+        </a:solidFill>
+        <a:ln xmlns:a="http://schemas.openxmlformats.org/drawingml/2006/main">
+          <a:solidFill>
+            <a:sysClr val="windowText" lastClr="000000"/>
+          </a:solidFill>
+        </a:ln>
+      </cdr:spPr>
+      <cdr:txBody>
+        <a:bodyPr xmlns:a="http://schemas.openxmlformats.org/drawingml/2006/main" wrap="square" rtlCol="0"/>
+        <a:lstStyle xmlns:a="http://schemas.openxmlformats.org/drawingml/2006/main">
+          <a:lvl1pPr marL="0" indent="0">
+            <a:defRPr sz="1100">
+              <a:latin typeface="+mn-lt"/>
+              <a:ea typeface="+mn-ea"/>
+              <a:cs typeface="+mn-cs"/>
+            </a:defRPr>
+          </a:lvl1pPr>
+          <a:lvl2pPr marL="457200" indent="0">
+            <a:defRPr sz="1100">
+              <a:latin typeface="+mn-lt"/>
+              <a:ea typeface="+mn-ea"/>
+              <a:cs typeface="+mn-cs"/>
+            </a:defRPr>
+          </a:lvl2pPr>
+          <a:lvl3pPr marL="914400" indent="0">
+            <a:defRPr sz="1100">
+              <a:latin typeface="+mn-lt"/>
+              <a:ea typeface="+mn-ea"/>
+              <a:cs typeface="+mn-cs"/>
+            </a:defRPr>
+          </a:lvl3pPr>
+          <a:lvl4pPr marL="1371600" indent="0">
+            <a:defRPr sz="1100">
+              <a:latin typeface="+mn-lt"/>
+              <a:ea typeface="+mn-ea"/>
+              <a:cs typeface="+mn-cs"/>
+            </a:defRPr>
+          </a:lvl4pPr>
+          <a:lvl5pPr marL="1828800" indent="0">
+            <a:defRPr sz="1100">
+              <a:latin typeface="+mn-lt"/>
+              <a:ea typeface="+mn-ea"/>
+              <a:cs typeface="+mn-cs"/>
+            </a:defRPr>
+          </a:lvl5pPr>
+          <a:lvl6pPr marL="2286000" indent="0">
+            <a:defRPr sz="1100">
+              <a:latin typeface="+mn-lt"/>
+              <a:ea typeface="+mn-ea"/>
+              <a:cs typeface="+mn-cs"/>
+            </a:defRPr>
+          </a:lvl6pPr>
+          <a:lvl7pPr marL="2743200" indent="0">
+            <a:defRPr sz="1100">
+              <a:latin typeface="+mn-lt"/>
+              <a:ea typeface="+mn-ea"/>
+              <a:cs typeface="+mn-cs"/>
+            </a:defRPr>
+          </a:lvl7pPr>
+          <a:lvl8pPr marL="3200400" indent="0">
+            <a:defRPr sz="1100">
+              <a:latin typeface="+mn-lt"/>
+              <a:ea typeface="+mn-ea"/>
+              <a:cs typeface="+mn-cs"/>
+            </a:defRPr>
+          </a:lvl8pPr>
+          <a:lvl9pPr marL="3657600" indent="0">
+            <a:defRPr sz="1100">
+              <a:latin typeface="+mn-lt"/>
+              <a:ea typeface="+mn-ea"/>
+              <a:cs typeface="+mn-cs"/>
+            </a:defRPr>
+          </a:lvl9pPr>
+        </a:lstStyle>
+        <a:p xmlns:a="http://schemas.openxmlformats.org/drawingml/2006/main">
+          <a:pPr algn="ctr"/>
+          <a:r>
+            <a:rPr lang="en-US" sz="1400" b="1" dirty="0" smtClean="0">
+              <a:solidFill>
+                <a:schemeClr val="bg1"/>
+              </a:solidFill>
+              <a:latin typeface="Times New Roman" pitchFamily="18" charset="0"/>
+              <a:cs typeface="Times New Roman" pitchFamily="18" charset="0"/>
+            </a:rPr>
+            <a:t> </a:t>
+          </a:r>
+          <a:r>
+            <a:rPr lang="en-US" sz="1400" b="1" dirty="0" smtClean="0">
+              <a:solidFill>
+                <a:sysClr val="windowText" lastClr="000000"/>
+              </a:solidFill>
+              <a:latin typeface="Times New Roman" pitchFamily="18" charset="0"/>
+              <a:cs typeface="Times New Roman" pitchFamily="18" charset="0"/>
+            </a:rPr>
+            <a:t>Military</a:t>
+          </a:r>
+          <a:r>
+            <a:rPr lang="en-US" sz="1400" b="1" baseline="0" dirty="0" smtClean="0">
+              <a:solidFill>
+                <a:sysClr val="windowText" lastClr="000000"/>
+              </a:solidFill>
+              <a:latin typeface="Times New Roman" pitchFamily="18" charset="0"/>
+              <a:cs typeface="Times New Roman" pitchFamily="18" charset="0"/>
+            </a:rPr>
+            <a:t> </a:t>
+          </a:r>
+          <a:r>
+            <a:rPr lang="en-US" sz="1400" b="1" dirty="0" smtClean="0">
+              <a:solidFill>
+                <a:sysClr val="windowText" lastClr="000000"/>
+              </a:solidFill>
+              <a:latin typeface="Times New Roman" pitchFamily="18" charset="0"/>
+              <a:cs typeface="Times New Roman" pitchFamily="18" charset="0"/>
+            </a:rPr>
+            <a:t>Missions: &gt;100</a:t>
+          </a:r>
+          <a:r>
+            <a:rPr lang="en-US" sz="1400" b="1" baseline="0" dirty="0" smtClean="0">
+              <a:solidFill>
+                <a:sysClr val="windowText" lastClr="000000"/>
+              </a:solidFill>
+              <a:latin typeface="Times New Roman" pitchFamily="18" charset="0"/>
+              <a:cs typeface="Times New Roman" pitchFamily="18" charset="0"/>
+            </a:rPr>
+            <a:t> kg</a:t>
+          </a:r>
+          <a:endParaRPr lang="en-US" sz="1400" b="1" dirty="0">
+            <a:solidFill>
+              <a:sysClr val="windowText" lastClr="000000"/>
+            </a:solidFill>
+            <a:latin typeface="Times New Roman" pitchFamily="18" charset="0"/>
+            <a:cs typeface="Times New Roman" pitchFamily="18" charset="0"/>
+          </a:endParaRPr>
         </a:p>
       </cdr:txBody>
     </cdr:sp>
@@ -3616,7 +4728,8 @@
           <a:p>
             <a:fld id="{A6F419AA-BDEA-468B-92DF-D55193391F30}" type="datetimeFigureOut">
               <a:rPr lang="en-US" smtClean="0"/>
-              <a:t>11/30/2013</a:t>
+              <a:pPr/>
+              <a:t>12/8/2013</a:t>
             </a:fld>
             <a:endParaRPr lang="en-US"/>
           </a:p>
@@ -3658,6 +4771,7 @@
           <a:p>
             <a:fld id="{8BD77E41-4DC1-4AFA-B184-C4F0CB30532D}" type="slidenum">
               <a:rPr lang="en-US" smtClean="0"/>
+              <a:pPr/>
               <a:t>‹#›</a:t>
             </a:fld>
             <a:endParaRPr lang="en-US"/>
@@ -3781,7 +4895,8 @@
           <a:p>
             <a:fld id="{A6F419AA-BDEA-468B-92DF-D55193391F30}" type="datetimeFigureOut">
               <a:rPr lang="en-US" smtClean="0"/>
-              <a:t>11/30/2013</a:t>
+              <a:pPr/>
+              <a:t>12/8/2013</a:t>
             </a:fld>
             <a:endParaRPr lang="en-US"/>
           </a:p>
@@ -3823,6 +4938,7 @@
           <a:p>
             <a:fld id="{8BD77E41-4DC1-4AFA-B184-C4F0CB30532D}" type="slidenum">
               <a:rPr lang="en-US" smtClean="0"/>
+              <a:pPr/>
               <a:t>‹#›</a:t>
             </a:fld>
             <a:endParaRPr lang="en-US"/>
@@ -3956,7 +5072,8 @@
           <a:p>
             <a:fld id="{A6F419AA-BDEA-468B-92DF-D55193391F30}" type="datetimeFigureOut">
               <a:rPr lang="en-US" smtClean="0"/>
-              <a:t>11/30/2013</a:t>
+              <a:pPr/>
+              <a:t>12/8/2013</a:t>
             </a:fld>
             <a:endParaRPr lang="en-US"/>
           </a:p>
@@ -3998,6 +5115,7 @@
           <a:p>
             <a:fld id="{8BD77E41-4DC1-4AFA-B184-C4F0CB30532D}" type="slidenum">
               <a:rPr lang="en-US" smtClean="0"/>
+              <a:pPr/>
               <a:t>‹#›</a:t>
             </a:fld>
             <a:endParaRPr lang="en-US"/>
@@ -4121,7 +5239,8 @@
           <a:p>
             <a:fld id="{A6F419AA-BDEA-468B-92DF-D55193391F30}" type="datetimeFigureOut">
               <a:rPr lang="en-US" smtClean="0"/>
-              <a:t>11/30/2013</a:t>
+              <a:pPr/>
+              <a:t>12/8/2013</a:t>
             </a:fld>
             <a:endParaRPr lang="en-US"/>
           </a:p>
@@ -4163,6 +5282,7 @@
           <a:p>
             <a:fld id="{8BD77E41-4DC1-4AFA-B184-C4F0CB30532D}" type="slidenum">
               <a:rPr lang="en-US" smtClean="0"/>
+              <a:pPr/>
               <a:t>‹#›</a:t>
             </a:fld>
             <a:endParaRPr lang="en-US"/>
@@ -4362,7 +5482,8 @@
           <a:p>
             <a:fld id="{A6F419AA-BDEA-468B-92DF-D55193391F30}" type="datetimeFigureOut">
               <a:rPr lang="en-US" smtClean="0"/>
-              <a:t>11/30/2013</a:t>
+              <a:pPr/>
+              <a:t>12/8/2013</a:t>
             </a:fld>
             <a:endParaRPr lang="en-US"/>
           </a:p>
@@ -4404,6 +5525,7 @@
           <a:p>
             <a:fld id="{8BD77E41-4DC1-4AFA-B184-C4F0CB30532D}" type="slidenum">
               <a:rPr lang="en-US" smtClean="0"/>
+              <a:pPr/>
               <a:t>‹#›</a:t>
             </a:fld>
             <a:endParaRPr lang="en-US"/>
@@ -4645,7 +5767,8 @@
           <a:p>
             <a:fld id="{A6F419AA-BDEA-468B-92DF-D55193391F30}" type="datetimeFigureOut">
               <a:rPr lang="en-US" smtClean="0"/>
-              <a:t>11/30/2013</a:t>
+              <a:pPr/>
+              <a:t>12/8/2013</a:t>
             </a:fld>
             <a:endParaRPr lang="en-US"/>
           </a:p>
@@ -4687,6 +5810,7 @@
           <a:p>
             <a:fld id="{8BD77E41-4DC1-4AFA-B184-C4F0CB30532D}" type="slidenum">
               <a:rPr lang="en-US" smtClean="0"/>
+              <a:pPr/>
               <a:t>‹#›</a:t>
             </a:fld>
             <a:endParaRPr lang="en-US"/>
@@ -5062,7 +6186,8 @@
           <a:p>
             <a:fld id="{A6F419AA-BDEA-468B-92DF-D55193391F30}" type="datetimeFigureOut">
               <a:rPr lang="en-US" smtClean="0"/>
-              <a:t>11/30/2013</a:t>
+              <a:pPr/>
+              <a:t>12/8/2013</a:t>
             </a:fld>
             <a:endParaRPr lang="en-US"/>
           </a:p>
@@ -5104,6 +6229,7 @@
           <a:p>
             <a:fld id="{8BD77E41-4DC1-4AFA-B184-C4F0CB30532D}" type="slidenum">
               <a:rPr lang="en-US" smtClean="0"/>
+              <a:pPr/>
               <a:t>‹#›</a:t>
             </a:fld>
             <a:endParaRPr lang="en-US"/>
@@ -5175,7 +6301,8 @@
           <a:p>
             <a:fld id="{A6F419AA-BDEA-468B-92DF-D55193391F30}" type="datetimeFigureOut">
               <a:rPr lang="en-US" smtClean="0"/>
-              <a:t>11/30/2013</a:t>
+              <a:pPr/>
+              <a:t>12/8/2013</a:t>
             </a:fld>
             <a:endParaRPr lang="en-US"/>
           </a:p>
@@ -5217,6 +6344,7 @@
           <a:p>
             <a:fld id="{8BD77E41-4DC1-4AFA-B184-C4F0CB30532D}" type="slidenum">
               <a:rPr lang="en-US" smtClean="0"/>
+              <a:pPr/>
               <a:t>‹#›</a:t>
             </a:fld>
             <a:endParaRPr lang="en-US"/>
@@ -5265,7 +6393,8 @@
           <a:p>
             <a:fld id="{A6F419AA-BDEA-468B-92DF-D55193391F30}" type="datetimeFigureOut">
               <a:rPr lang="en-US" smtClean="0"/>
-              <a:t>11/30/2013</a:t>
+              <a:pPr/>
+              <a:t>12/8/2013</a:t>
             </a:fld>
             <a:endParaRPr lang="en-US"/>
           </a:p>
@@ -5307,6 +6436,7 @@
           <a:p>
             <a:fld id="{8BD77E41-4DC1-4AFA-B184-C4F0CB30532D}" type="slidenum">
               <a:rPr lang="en-US" smtClean="0"/>
+              <a:pPr/>
               <a:t>‹#›</a:t>
             </a:fld>
             <a:endParaRPr lang="en-US"/>
@@ -5537,7 +6667,8 @@
           <a:p>
             <a:fld id="{A6F419AA-BDEA-468B-92DF-D55193391F30}" type="datetimeFigureOut">
               <a:rPr lang="en-US" smtClean="0"/>
-              <a:t>11/30/2013</a:t>
+              <a:pPr/>
+              <a:t>12/8/2013</a:t>
             </a:fld>
             <a:endParaRPr lang="en-US"/>
           </a:p>
@@ -5579,6 +6710,7 @@
           <a:p>
             <a:fld id="{8BD77E41-4DC1-4AFA-B184-C4F0CB30532D}" type="slidenum">
               <a:rPr lang="en-US" smtClean="0"/>
+              <a:pPr/>
               <a:t>‹#›</a:t>
             </a:fld>
             <a:endParaRPr lang="en-US"/>
@@ -5785,7 +6917,8 @@
           <a:p>
             <a:fld id="{A6F419AA-BDEA-468B-92DF-D55193391F30}" type="datetimeFigureOut">
               <a:rPr lang="en-US" smtClean="0"/>
-              <a:t>11/30/2013</a:t>
+              <a:pPr/>
+              <a:t>12/8/2013</a:t>
             </a:fld>
             <a:endParaRPr lang="en-US"/>
           </a:p>
@@ -5827,6 +6960,7 @@
           <a:p>
             <a:fld id="{8BD77E41-4DC1-4AFA-B184-C4F0CB30532D}" type="slidenum">
               <a:rPr lang="en-US" smtClean="0"/>
+              <a:pPr/>
               <a:t>‹#›</a:t>
             </a:fld>
             <a:endParaRPr lang="en-US"/>
@@ -5993,7 +7127,8 @@
           <a:p>
             <a:fld id="{A6F419AA-BDEA-468B-92DF-D55193391F30}" type="datetimeFigureOut">
               <a:rPr lang="en-US" smtClean="0"/>
-              <a:t>11/30/2013</a:t>
+              <a:pPr/>
+              <a:t>12/8/2013</a:t>
             </a:fld>
             <a:endParaRPr lang="en-US"/>
           </a:p>
@@ -6071,6 +7206,7 @@
           <a:p>
             <a:fld id="{8BD77E41-4DC1-4AFA-B184-C4F0CB30532D}" type="slidenum">
               <a:rPr lang="en-US" smtClean="0"/>
+              <a:pPr/>
               <a:t>‹#›</a:t>
             </a:fld>
             <a:endParaRPr lang="en-US"/>
@@ -6451,15 +7587,15 @@
       </p:grpSpPr>
       <p:graphicFrame>
         <p:nvGraphicFramePr>
-          <p:cNvPr id="6" name="Chart 5"/>
+          <p:cNvPr id="4" name="Chart 3"/>
           <p:cNvGraphicFramePr>
             <a:graphicFrameLocks noGrp="1"/>
           </p:cNvGraphicFramePr>
           <p:nvPr/>
         </p:nvGraphicFramePr>
         <p:xfrm>
-          <a:off x="0" y="0"/>
-          <a:ext cx="9144000" cy="6858000"/>
+          <a:off x="236904" y="284529"/>
+          <a:ext cx="8670192" cy="6288942"/>
         </p:xfrm>
         <a:graphic>
           <a:graphicData uri="http://schemas.openxmlformats.org/drawingml/2006/chart">
@@ -6467,6 +7603,234 @@
           </a:graphicData>
         </a:graphic>
       </p:graphicFrame>
+      <p:pic>
+        <p:nvPicPr>
+          <p:cNvPr id="1026" name="Picture 2" descr="http://images.spaceref.com/news/2013/ooPicture-2Aerocube-4.jpg"/>
+          <p:cNvPicPr>
+            <a:picLocks noChangeAspect="1" noChangeArrowheads="1"/>
+          </p:cNvPicPr>
+          <p:nvPr/>
+        </p:nvPicPr>
+        <p:blipFill>
+          <a:blip r:embed="rId3" cstate="print"/>
+          <a:srcRect/>
+          <a:stretch>
+            <a:fillRect/>
+          </a:stretch>
+        </p:blipFill>
+        <p:spPr bwMode="auto">
+          <a:xfrm>
+            <a:off x="990601" y="2209800"/>
+            <a:ext cx="2362200" cy="1676400"/>
+          </a:xfrm>
+          <a:prstGeom prst="rect">
+            <a:avLst/>
+          </a:prstGeom>
+          <a:noFill/>
+          <a:ln>
+            <a:solidFill>
+              <a:schemeClr val="tx1"/>
+            </a:solidFill>
+          </a:ln>
+        </p:spPr>
+      </p:pic>
+      <p:pic>
+        <p:nvPicPr>
+          <p:cNvPr id="1028" name="Picture 4" descr="http://www.spacetoday.net/images/dart.jpg"/>
+          <p:cNvPicPr>
+            <a:picLocks noChangeAspect="1" noChangeArrowheads="1"/>
+          </p:cNvPicPr>
+          <p:nvPr/>
+        </p:nvPicPr>
+        <p:blipFill>
+          <a:blip r:embed="rId4" cstate="print"/>
+          <a:srcRect/>
+          <a:stretch>
+            <a:fillRect/>
+          </a:stretch>
+        </p:blipFill>
+        <p:spPr bwMode="auto">
+          <a:xfrm>
+            <a:off x="3962400" y="2209800"/>
+            <a:ext cx="1600200" cy="1600200"/>
+          </a:xfrm>
+          <a:prstGeom prst="rect">
+            <a:avLst/>
+          </a:prstGeom>
+          <a:noFill/>
+          <a:ln>
+            <a:solidFill>
+              <a:schemeClr val="tx1"/>
+            </a:solidFill>
+          </a:ln>
+        </p:spPr>
+      </p:pic>
+      <p:pic>
+        <p:nvPicPr>
+          <p:cNvPr id="1030" name="Picture 6" descr="http://archive.darpa.mil/orbitalexpress/images/OE_1.jpg"/>
+          <p:cNvPicPr>
+            <a:picLocks noChangeAspect="1" noChangeArrowheads="1"/>
+          </p:cNvPicPr>
+          <p:nvPr/>
+        </p:nvPicPr>
+        <p:blipFill>
+          <a:blip r:embed="rId5" cstate="print"/>
+          <a:srcRect/>
+          <a:stretch>
+            <a:fillRect/>
+          </a:stretch>
+        </p:blipFill>
+        <p:spPr bwMode="auto">
+          <a:xfrm>
+            <a:off x="6324600" y="2209800"/>
+            <a:ext cx="2455817" cy="1600200"/>
+          </a:xfrm>
+          <a:prstGeom prst="rect">
+            <a:avLst/>
+          </a:prstGeom>
+          <a:noFill/>
+          <a:ln>
+            <a:solidFill>
+              <a:schemeClr val="tx1"/>
+            </a:solidFill>
+          </a:ln>
+        </p:spPr>
+      </p:pic>
+      <p:sp>
+        <p:nvSpPr>
+          <p:cNvPr id="8" name="Straight Arrow Connector 7"/>
+          <p:cNvSpPr/>
+          <p:nvPr/>
+        </p:nvSpPr>
+        <p:spPr>
+          <a:xfrm flipH="1">
+            <a:off x="4321648" y="3148136"/>
+            <a:ext cx="500703" cy="561729"/>
+          </a:xfrm>
+          <a:prstGeom prst="straightConnector1">
+            <a:avLst/>
+          </a:prstGeom>
+          <a:ln w="38100">
+            <a:solidFill>
+              <a:sysClr val="windowText" lastClr="000000"/>
+            </a:solidFill>
+            <a:headEnd type="none" w="med" len="med"/>
+            <a:tailEnd type="triangle" w="med" len="med"/>
+          </a:ln>
+        </p:spPr>
+        <p:style>
+          <a:lnRef idx="1">
+            <a:schemeClr val="accent1"/>
+          </a:lnRef>
+          <a:fillRef idx="0">
+            <a:schemeClr val="accent1"/>
+          </a:fillRef>
+          <a:effectRef idx="0">
+            <a:schemeClr val="accent1"/>
+          </a:effectRef>
+          <a:fontRef idx="minor">
+            <a:schemeClr val="tx1"/>
+          </a:fontRef>
+        </p:style>
+        <p:txBody>
+          <a:bodyPr/>
+          <a:lstStyle>
+            <a:lvl1pPr marL="0" indent="0">
+              <a:defRPr sz="1100">
+                <a:solidFill>
+                  <a:schemeClr val="tx1"/>
+                </a:solidFill>
+                <a:latin typeface="+mn-lt"/>
+                <a:ea typeface="+mn-ea"/>
+                <a:cs typeface="+mn-cs"/>
+              </a:defRPr>
+            </a:lvl1pPr>
+            <a:lvl2pPr marL="457200" indent="0">
+              <a:defRPr sz="1100">
+                <a:solidFill>
+                  <a:schemeClr val="tx1"/>
+                </a:solidFill>
+                <a:latin typeface="+mn-lt"/>
+                <a:ea typeface="+mn-ea"/>
+                <a:cs typeface="+mn-cs"/>
+              </a:defRPr>
+            </a:lvl2pPr>
+            <a:lvl3pPr marL="914400" indent="0">
+              <a:defRPr sz="1100">
+                <a:solidFill>
+                  <a:schemeClr val="tx1"/>
+                </a:solidFill>
+                <a:latin typeface="+mn-lt"/>
+                <a:ea typeface="+mn-ea"/>
+                <a:cs typeface="+mn-cs"/>
+              </a:defRPr>
+            </a:lvl3pPr>
+            <a:lvl4pPr marL="1371600" indent="0">
+              <a:defRPr sz="1100">
+                <a:solidFill>
+                  <a:schemeClr val="tx1"/>
+                </a:solidFill>
+                <a:latin typeface="+mn-lt"/>
+                <a:ea typeface="+mn-ea"/>
+                <a:cs typeface="+mn-cs"/>
+              </a:defRPr>
+            </a:lvl4pPr>
+            <a:lvl5pPr marL="1828800" indent="0">
+              <a:defRPr sz="1100">
+                <a:solidFill>
+                  <a:schemeClr val="tx1"/>
+                </a:solidFill>
+                <a:latin typeface="+mn-lt"/>
+                <a:ea typeface="+mn-ea"/>
+                <a:cs typeface="+mn-cs"/>
+              </a:defRPr>
+            </a:lvl5pPr>
+            <a:lvl6pPr marL="2286000" indent="0">
+              <a:defRPr sz="1100">
+                <a:solidFill>
+                  <a:schemeClr val="tx1"/>
+                </a:solidFill>
+                <a:latin typeface="+mn-lt"/>
+                <a:ea typeface="+mn-ea"/>
+                <a:cs typeface="+mn-cs"/>
+              </a:defRPr>
+            </a:lvl6pPr>
+            <a:lvl7pPr marL="2743200" indent="0">
+              <a:defRPr sz="1100">
+                <a:solidFill>
+                  <a:schemeClr val="tx1"/>
+                </a:solidFill>
+                <a:latin typeface="+mn-lt"/>
+                <a:ea typeface="+mn-ea"/>
+                <a:cs typeface="+mn-cs"/>
+              </a:defRPr>
+            </a:lvl7pPr>
+            <a:lvl8pPr marL="3200400" indent="0">
+              <a:defRPr sz="1100">
+                <a:solidFill>
+                  <a:schemeClr val="tx1"/>
+                </a:solidFill>
+                <a:latin typeface="+mn-lt"/>
+                <a:ea typeface="+mn-ea"/>
+                <a:cs typeface="+mn-cs"/>
+              </a:defRPr>
+            </a:lvl8pPr>
+            <a:lvl9pPr marL="3657600" indent="0">
+              <a:defRPr sz="1100">
+                <a:solidFill>
+                  <a:schemeClr val="tx1"/>
+                </a:solidFill>
+                <a:latin typeface="+mn-lt"/>
+                <a:ea typeface="+mn-ea"/>
+                <a:cs typeface="+mn-cs"/>
+              </a:defRPr>
+            </a:lvl9pPr>
+          </a:lstStyle>
+          <a:p>
+            <a:endParaRPr lang="en-US"/>
+          </a:p>
+        </p:txBody>
+      </p:sp>
     </p:spTree>
   </p:cSld>
   <p:clrMapOvr>

</xml_diff>